<commit_message>
Actualización sesión 5, se incluyen ADC y DAC
</commit_message>
<xml_diff>
--- a/Sesion_5/Sesion_5.pptx
+++ b/Sesion_5/Sesion_5.pptx
@@ -900,22 +900,163 @@
   <pc:docChgLst>
     <pc:chgData name="JHEYSON FABIAN VILLAVISAN BUITRAGO" userId="e5ced5c2-d787-455d-b115-4f08a699b8c8" providerId="ADAL" clId="{FAC55BE7-3CF8-4D52-93E0-9321610DE310}"/>
     <pc:docChg chg="undo custSel modSld">
-      <pc:chgData name="JHEYSON FABIAN VILLAVISAN BUITRAGO" userId="e5ced5c2-d787-455d-b115-4f08a699b8c8" providerId="ADAL" clId="{FAC55BE7-3CF8-4D52-93E0-9321610DE310}" dt="2025-02-11T16:25:55.018" v="53" actId="20577"/>
+      <pc:chgData name="JHEYSON FABIAN VILLAVISAN BUITRAGO" userId="e5ced5c2-d787-455d-b115-4f08a699b8c8" providerId="ADAL" clId="{FAC55BE7-3CF8-4D52-93E0-9321610DE310}" dt="2025-02-13T15:55:57.155" v="54" actId="790"/>
       <pc:docMkLst>
         <pc:docMk/>
       </pc:docMkLst>
       <pc:sldChg chg="modSp mod">
-        <pc:chgData name="JHEYSON FABIAN VILLAVISAN BUITRAGO" userId="e5ced5c2-d787-455d-b115-4f08a699b8c8" providerId="ADAL" clId="{FAC55BE7-3CF8-4D52-93E0-9321610DE310}" dt="2025-02-11T16:25:55.018" v="53" actId="20577"/>
+        <pc:chgData name="JHEYSON FABIAN VILLAVISAN BUITRAGO" userId="e5ced5c2-d787-455d-b115-4f08a699b8c8" providerId="ADAL" clId="{FAC55BE7-3CF8-4D52-93E0-9321610DE310}" dt="2025-02-13T15:55:57.155" v="54" actId="790"/>
+        <pc:sldMkLst>
+          <pc:docMk/>
+          <pc:sldMk cId="0" sldId="256"/>
+        </pc:sldMkLst>
+        <pc:spChg chg="mod">
+          <ac:chgData name="JHEYSON FABIAN VILLAVISAN BUITRAGO" userId="e5ced5c2-d787-455d-b115-4f08a699b8c8" providerId="ADAL" clId="{FAC55BE7-3CF8-4D52-93E0-9321610DE310}" dt="2025-02-13T15:55:57.155" v="54" actId="790"/>
+          <ac:spMkLst>
+            <pc:docMk/>
+            <pc:sldMk cId="0" sldId="256"/>
+            <ac:spMk id="10" creationId="{0D52910C-C7FF-51AD-9B9D-1A390D5FFE1B}"/>
+          </ac:spMkLst>
+        </pc:spChg>
+        <pc:spChg chg="mod">
+          <ac:chgData name="JHEYSON FABIAN VILLAVISAN BUITRAGO" userId="e5ced5c2-d787-455d-b115-4f08a699b8c8" providerId="ADAL" clId="{FAC55BE7-3CF8-4D52-93E0-9321610DE310}" dt="2025-02-13T15:55:57.155" v="54" actId="790"/>
+          <ac:spMkLst>
+            <pc:docMk/>
+            <pc:sldMk cId="0" sldId="256"/>
+            <ac:spMk id="5122" creationId="{612B5792-076C-452D-8592-DDADCC263C58}"/>
+          </ac:spMkLst>
+        </pc:spChg>
+        <pc:spChg chg="mod">
+          <ac:chgData name="JHEYSON FABIAN VILLAVISAN BUITRAGO" userId="e5ced5c2-d787-455d-b115-4f08a699b8c8" providerId="ADAL" clId="{FAC55BE7-3CF8-4D52-93E0-9321610DE310}" dt="2025-02-13T15:55:57.155" v="54" actId="790"/>
+          <ac:spMkLst>
+            <pc:docMk/>
+            <pc:sldMk cId="0" sldId="256"/>
+            <ac:spMk id="5124" creationId="{75207037-66AB-408E-B44C-6489E27F4A1E}"/>
+          </ac:spMkLst>
+        </pc:spChg>
+      </pc:sldChg>
+      <pc:sldChg chg="modSp mod">
+        <pc:chgData name="JHEYSON FABIAN VILLAVISAN BUITRAGO" userId="e5ced5c2-d787-455d-b115-4f08a699b8c8" providerId="ADAL" clId="{FAC55BE7-3CF8-4D52-93E0-9321610DE310}" dt="2025-02-13T15:55:57.155" v="54" actId="790"/>
+        <pc:sldMkLst>
+          <pc:docMk/>
+          <pc:sldMk cId="3709177429" sldId="274"/>
+        </pc:sldMkLst>
+        <pc:spChg chg="mod">
+          <ac:chgData name="JHEYSON FABIAN VILLAVISAN BUITRAGO" userId="e5ced5c2-d787-455d-b115-4f08a699b8c8" providerId="ADAL" clId="{FAC55BE7-3CF8-4D52-93E0-9321610DE310}" dt="2025-02-13T15:55:57.155" v="54" actId="790"/>
+          <ac:spMkLst>
+            <pc:docMk/>
+            <pc:sldMk cId="3709177429" sldId="274"/>
+            <ac:spMk id="2" creationId="{FB1B6180-BCA0-4F51-9F68-9E5BAB8A4FDC}"/>
+          </ac:spMkLst>
+        </pc:spChg>
+        <pc:spChg chg="mod">
+          <ac:chgData name="JHEYSON FABIAN VILLAVISAN BUITRAGO" userId="e5ced5c2-d787-455d-b115-4f08a699b8c8" providerId="ADAL" clId="{FAC55BE7-3CF8-4D52-93E0-9321610DE310}" dt="2025-02-13T15:55:57.155" v="54" actId="790"/>
+          <ac:spMkLst>
+            <pc:docMk/>
+            <pc:sldMk cId="3709177429" sldId="274"/>
+            <ac:spMk id="4" creationId="{2C7E43D4-8286-4BEE-907B-3A35AE701C90}"/>
+          </ac:spMkLst>
+        </pc:spChg>
+        <pc:spChg chg="mod">
+          <ac:chgData name="JHEYSON FABIAN VILLAVISAN BUITRAGO" userId="e5ced5c2-d787-455d-b115-4f08a699b8c8" providerId="ADAL" clId="{FAC55BE7-3CF8-4D52-93E0-9321610DE310}" dt="2025-02-13T15:55:57.155" v="54" actId="790"/>
+          <ac:spMkLst>
+            <pc:docMk/>
+            <pc:sldMk cId="3709177429" sldId="274"/>
+            <ac:spMk id="5" creationId="{AD83FA30-4A3C-43B8-17CD-C08519129156}"/>
+          </ac:spMkLst>
+        </pc:spChg>
+        <pc:spChg chg="mod">
+          <ac:chgData name="JHEYSON FABIAN VILLAVISAN BUITRAGO" userId="e5ced5c2-d787-455d-b115-4f08a699b8c8" providerId="ADAL" clId="{FAC55BE7-3CF8-4D52-93E0-9321610DE310}" dt="2025-02-13T15:55:57.155" v="54" actId="790"/>
+          <ac:spMkLst>
+            <pc:docMk/>
+            <pc:sldMk cId="3709177429" sldId="274"/>
+            <ac:spMk id="10" creationId="{AF4E183E-A171-4923-A99E-D149888CEC37}"/>
+          </ac:spMkLst>
+        </pc:spChg>
+      </pc:sldChg>
+      <pc:sldChg chg="modSp mod">
+        <pc:chgData name="JHEYSON FABIAN VILLAVISAN BUITRAGO" userId="e5ced5c2-d787-455d-b115-4f08a699b8c8" providerId="ADAL" clId="{FAC55BE7-3CF8-4D52-93E0-9321610DE310}" dt="2025-02-13T15:55:57.155" v="54" actId="790"/>
+        <pc:sldMkLst>
+          <pc:docMk/>
+          <pc:sldMk cId="2965408220" sldId="280"/>
+        </pc:sldMkLst>
+        <pc:spChg chg="mod">
+          <ac:chgData name="JHEYSON FABIAN VILLAVISAN BUITRAGO" userId="e5ced5c2-d787-455d-b115-4f08a699b8c8" providerId="ADAL" clId="{FAC55BE7-3CF8-4D52-93E0-9321610DE310}" dt="2025-02-13T15:55:57.155" v="54" actId="790"/>
+          <ac:spMkLst>
+            <pc:docMk/>
+            <pc:sldMk cId="2965408220" sldId="280"/>
+            <ac:spMk id="2" creationId="{DC12FCB8-0305-E041-1893-DDFE85DEBAFF}"/>
+          </ac:spMkLst>
+        </pc:spChg>
+        <pc:spChg chg="mod">
+          <ac:chgData name="JHEYSON FABIAN VILLAVISAN BUITRAGO" userId="e5ced5c2-d787-455d-b115-4f08a699b8c8" providerId="ADAL" clId="{FAC55BE7-3CF8-4D52-93E0-9321610DE310}" dt="2025-02-13T15:55:57.155" v="54" actId="790"/>
+          <ac:spMkLst>
+            <pc:docMk/>
+            <pc:sldMk cId="2965408220" sldId="280"/>
+            <ac:spMk id="8" creationId="{5932E3F1-24A7-A01F-0773-6237BD556E80}"/>
+          </ac:spMkLst>
+        </pc:spChg>
+        <pc:spChg chg="mod">
+          <ac:chgData name="JHEYSON FABIAN VILLAVISAN BUITRAGO" userId="e5ced5c2-d787-455d-b115-4f08a699b8c8" providerId="ADAL" clId="{FAC55BE7-3CF8-4D52-93E0-9321610DE310}" dt="2025-02-13T15:55:57.155" v="54" actId="790"/>
+          <ac:spMkLst>
+            <pc:docMk/>
+            <pc:sldMk cId="2965408220" sldId="280"/>
+            <ac:spMk id="9" creationId="{79EF761A-FEAD-D9F3-BD56-49599C4CE1E2}"/>
+          </ac:spMkLst>
+        </pc:spChg>
+        <pc:spChg chg="mod">
+          <ac:chgData name="JHEYSON FABIAN VILLAVISAN BUITRAGO" userId="e5ced5c2-d787-455d-b115-4f08a699b8c8" providerId="ADAL" clId="{FAC55BE7-3CF8-4D52-93E0-9321610DE310}" dt="2025-02-13T15:55:57.155" v="54" actId="790"/>
+          <ac:spMkLst>
+            <pc:docMk/>
+            <pc:sldMk cId="2965408220" sldId="280"/>
+            <ac:spMk id="11266" creationId="{74AD047A-E86C-4E92-874D-BAA043AB0B46}"/>
+          </ac:spMkLst>
+        </pc:spChg>
+        <pc:graphicFrameChg chg="modGraphic">
+          <ac:chgData name="JHEYSON FABIAN VILLAVISAN BUITRAGO" userId="e5ced5c2-d787-455d-b115-4f08a699b8c8" providerId="ADAL" clId="{FAC55BE7-3CF8-4D52-93E0-9321610DE310}" dt="2025-02-13T15:55:57.155" v="54" actId="790"/>
+          <ac:graphicFrameMkLst>
+            <pc:docMk/>
+            <pc:sldMk cId="2965408220" sldId="280"/>
+            <ac:graphicFrameMk id="6" creationId="{D45444DB-DE93-829B-F32A-C3FB962F868B}"/>
+          </ac:graphicFrameMkLst>
+        </pc:graphicFrameChg>
+      </pc:sldChg>
+      <pc:sldChg chg="modSp mod">
+        <pc:chgData name="JHEYSON FABIAN VILLAVISAN BUITRAGO" userId="e5ced5c2-d787-455d-b115-4f08a699b8c8" providerId="ADAL" clId="{FAC55BE7-3CF8-4D52-93E0-9321610DE310}" dt="2025-02-13T15:55:57.155" v="54" actId="790"/>
         <pc:sldMkLst>
           <pc:docMk/>
           <pc:sldMk cId="4035662027" sldId="286"/>
         </pc:sldMkLst>
         <pc:spChg chg="mod">
-          <ac:chgData name="JHEYSON FABIAN VILLAVISAN BUITRAGO" userId="e5ced5c2-d787-455d-b115-4f08a699b8c8" providerId="ADAL" clId="{FAC55BE7-3CF8-4D52-93E0-9321610DE310}" dt="2025-02-11T16:25:55.018" v="53" actId="20577"/>
+          <ac:chgData name="JHEYSON FABIAN VILLAVISAN BUITRAGO" userId="e5ced5c2-d787-455d-b115-4f08a699b8c8" providerId="ADAL" clId="{FAC55BE7-3CF8-4D52-93E0-9321610DE310}" dt="2025-02-13T15:55:57.155" v="54" actId="790"/>
+          <ac:spMkLst>
+            <pc:docMk/>
+            <pc:sldMk cId="4035662027" sldId="286"/>
+            <ac:spMk id="2" creationId="{D56DAEEF-8284-6112-BD0A-EDC7DFEA223F}"/>
+          </ac:spMkLst>
+        </pc:spChg>
+        <pc:spChg chg="mod">
+          <ac:chgData name="JHEYSON FABIAN VILLAVISAN BUITRAGO" userId="e5ced5c2-d787-455d-b115-4f08a699b8c8" providerId="ADAL" clId="{FAC55BE7-3CF8-4D52-93E0-9321610DE310}" dt="2025-02-13T15:55:57.155" v="54" actId="790"/>
           <ac:spMkLst>
             <pc:docMk/>
             <pc:sldMk cId="4035662027" sldId="286"/>
             <ac:spMk id="4" creationId="{8A0CF200-2A59-F009-B9B5-2579EA98BD8F}"/>
+          </ac:spMkLst>
+        </pc:spChg>
+        <pc:spChg chg="mod">
+          <ac:chgData name="JHEYSON FABIAN VILLAVISAN BUITRAGO" userId="e5ced5c2-d787-455d-b115-4f08a699b8c8" providerId="ADAL" clId="{FAC55BE7-3CF8-4D52-93E0-9321610DE310}" dt="2025-02-13T15:55:57.155" v="54" actId="790"/>
+          <ac:spMkLst>
+            <pc:docMk/>
+            <pc:sldMk cId="4035662027" sldId="286"/>
+            <ac:spMk id="5" creationId="{2803F4C8-525C-34A9-42AA-C33FE680A880}"/>
+          </ac:spMkLst>
+        </pc:spChg>
+        <pc:spChg chg="mod">
+          <ac:chgData name="JHEYSON FABIAN VILLAVISAN BUITRAGO" userId="e5ced5c2-d787-455d-b115-4f08a699b8c8" providerId="ADAL" clId="{FAC55BE7-3CF8-4D52-93E0-9321610DE310}" dt="2025-02-13T15:55:57.155" v="54" actId="790"/>
+          <ac:spMkLst>
+            <pc:docMk/>
+            <pc:sldMk cId="4035662027" sldId="286"/>
+            <ac:spMk id="10" creationId="{F963AE1B-BA6C-6901-0CBF-73BCCDFF8622}"/>
           </ac:spMkLst>
         </pc:spChg>
       </pc:sldChg>
@@ -1141,7 +1282,7 @@
               <a:pPr>
                 <a:defRPr/>
               </a:pPr>
-              <a:t>11/02/2025</a:t>
+              <a:t>13/02/2025</a:t>
             </a:fld>
             <a:endParaRPr lang="es-CO"/>
           </a:p>
@@ -1384,7 +1525,7 @@
               <a:pPr>
                 <a:defRPr/>
               </a:pPr>
-              <a:t>11/02/2025</a:t>
+              <a:t>13/02/2025</a:t>
             </a:fld>
             <a:endParaRPr lang="es-CO"/>
           </a:p>
@@ -2460,7 +2601,7 @@
           <a:p>
             <a:fld id="{9CF7635E-2D71-42E7-9E6C-FBB85A15A85F}" type="datetimeFigureOut">
               <a:rPr lang="es-CO" smtClean="0"/>
-              <a:t>11/02/2025</a:t>
+              <a:t>13/02/2025</a:t>
             </a:fld>
             <a:endParaRPr lang="es-CO"/>
           </a:p>
@@ -2726,7 +2867,7 @@
           <a:p>
             <a:fld id="{9CF7635E-2D71-42E7-9E6C-FBB85A15A85F}" type="datetimeFigureOut">
               <a:rPr lang="es-CO" smtClean="0"/>
-              <a:t>11/02/2025</a:t>
+              <a:t>13/02/2025</a:t>
             </a:fld>
             <a:endParaRPr lang="es-CO"/>
           </a:p>
@@ -2942,7 +3083,7 @@
           <a:p>
             <a:fld id="{9CF7635E-2D71-42E7-9E6C-FBB85A15A85F}" type="datetimeFigureOut">
               <a:rPr lang="es-CO" smtClean="0"/>
-              <a:t>11/02/2025</a:t>
+              <a:t>13/02/2025</a:t>
             </a:fld>
             <a:endParaRPr lang="es-CO"/>
           </a:p>
@@ -4571,7 +4712,7 @@
           <a:p>
             <a:fld id="{9CF7635E-2D71-42E7-9E6C-FBB85A15A85F}" type="datetimeFigureOut">
               <a:rPr lang="es-CO" smtClean="0"/>
-              <a:t>11/02/2025</a:t>
+              <a:t>13/02/2025</a:t>
             </a:fld>
             <a:endParaRPr lang="es-CO"/>
           </a:p>
@@ -5018,7 +5159,7 @@
           <a:p>
             <a:fld id="{9CF7635E-2D71-42E7-9E6C-FBB85A15A85F}" type="datetimeFigureOut">
               <a:rPr lang="es-CO" smtClean="0"/>
-              <a:t>11/02/2025</a:t>
+              <a:t>13/02/2025</a:t>
             </a:fld>
             <a:endParaRPr lang="es-CO"/>
           </a:p>
@@ -5292,7 +5433,7 @@
           <a:p>
             <a:fld id="{9CF7635E-2D71-42E7-9E6C-FBB85A15A85F}" type="datetimeFigureOut">
               <a:rPr lang="es-CO" smtClean="0"/>
-              <a:t>11/02/2025</a:t>
+              <a:t>13/02/2025</a:t>
             </a:fld>
             <a:endParaRPr lang="es-CO"/>
           </a:p>
@@ -5713,7 +5854,7 @@
           <a:p>
             <a:fld id="{9CF7635E-2D71-42E7-9E6C-FBB85A15A85F}" type="datetimeFigureOut">
               <a:rPr lang="es-CO" smtClean="0"/>
-              <a:t>11/02/2025</a:t>
+              <a:t>13/02/2025</a:t>
             </a:fld>
             <a:endParaRPr lang="es-CO"/>
           </a:p>
@@ -5861,7 +6002,7 @@
           <a:p>
             <a:fld id="{9CF7635E-2D71-42E7-9E6C-FBB85A15A85F}" type="datetimeFigureOut">
               <a:rPr lang="es-CO" smtClean="0"/>
-              <a:t>11/02/2025</a:t>
+              <a:t>13/02/2025</a:t>
             </a:fld>
             <a:endParaRPr lang="es-CO"/>
           </a:p>
@@ -5980,7 +6121,7 @@
           <a:p>
             <a:fld id="{9CF7635E-2D71-42E7-9E6C-FBB85A15A85F}" type="datetimeFigureOut">
               <a:rPr lang="es-CO" smtClean="0"/>
-              <a:t>11/02/2025</a:t>
+              <a:t>13/02/2025</a:t>
             </a:fld>
             <a:endParaRPr lang="es-CO"/>
           </a:p>
@@ -6299,7 +6440,7 @@
           <a:p>
             <a:fld id="{9CF7635E-2D71-42E7-9E6C-FBB85A15A85F}" type="datetimeFigureOut">
               <a:rPr lang="es-CO" smtClean="0"/>
-              <a:t>11/02/2025</a:t>
+              <a:t>13/02/2025</a:t>
             </a:fld>
             <a:endParaRPr lang="es-CO"/>
           </a:p>
@@ -6594,7 +6735,7 @@
           <a:p>
             <a:fld id="{9CF7635E-2D71-42E7-9E6C-FBB85A15A85F}" type="datetimeFigureOut">
               <a:rPr lang="es-CO" smtClean="0"/>
-              <a:t>11/02/2025</a:t>
+              <a:t>13/02/2025</a:t>
             </a:fld>
             <a:endParaRPr lang="es-CO"/>
           </a:p>
@@ -6843,7 +6984,7 @@
           <a:p>
             <a:fld id="{9CF7635E-2D71-42E7-9E6C-FBB85A15A85F}" type="datetimeFigureOut">
               <a:rPr lang="es-CO" smtClean="0"/>
-              <a:t>11/02/2025</a:t>
+              <a:t>13/02/2025</a:t>
             </a:fld>
             <a:endParaRPr lang="es-CO"/>
           </a:p>
@@ -7363,7 +7504,7 @@
           <a:p>
             <a:pPr algn="ctr" eaLnBrk="1" hangingPunct="1"/>
             <a:r>
-              <a:rPr lang="es-CO" altLang="es-CO" sz="3600" dirty="0"/>
+              <a:rPr lang="es-CO" sz="3600" noProof="0" dirty="0"/>
               <a:t>1</a:t>
             </a:r>
           </a:p>
@@ -7563,14 +7704,22 @@
               <a:buNone/>
             </a:pPr>
             <a:r>
-              <a:rPr lang="es-CO" altLang="es-CO" sz="2800" dirty="0">
+              <a:rPr lang="es-CO" sz="2800" noProof="0" dirty="0" err="1">
                 <a:solidFill>
                   <a:srgbClr val="898989"/>
                 </a:solidFill>
               </a:rPr>
-              <a:t>Jheyson F. Villavisan B</a:t>
+              <a:t>Jheyson</a:t>
             </a:r>
-            <a:endParaRPr lang="es-CO" altLang="es-CO" sz="1800" dirty="0">
+            <a:r>
+              <a:rPr lang="es-CO" sz="2800" noProof="0" dirty="0">
+                <a:solidFill>
+                  <a:srgbClr val="898989"/>
+                </a:solidFill>
+              </a:rPr>
+              <a:t> F. Villavisan B</a:t>
+            </a:r>
+            <a:endParaRPr lang="es-CO" sz="1800" noProof="0" dirty="0">
               <a:solidFill>
                 <a:srgbClr val="898989"/>
               </a:solidFill>
@@ -7581,7 +7730,7 @@
               <a:buFont typeface="Arial" panose="020B0604020202020204" pitchFamily="34" charset="0"/>
               <a:buNone/>
             </a:pPr>
-            <a:endParaRPr lang="es-CO" altLang="es-CO" sz="2400" dirty="0">
+            <a:endParaRPr lang="es-CO" sz="2400" noProof="0" dirty="0">
               <a:solidFill>
                 <a:srgbClr val="898989"/>
               </a:solidFill>
@@ -7803,7 +7952,7 @@
               <a:defRPr/>
             </a:pPr>
             <a:r>
-              <a:rPr lang="es-CO" sz="2000" b="1" dirty="0">
+              <a:rPr lang="es-CO" sz="2000" b="1" noProof="0" dirty="0">
                 <a:solidFill>
                   <a:schemeClr val="tx1">
                     <a:lumMod val="75000"/>
@@ -7916,7 +8065,7 @@
           <a:p>
             <a:pPr algn="ctr" eaLnBrk="1" hangingPunct="1"/>
             <a:r>
-              <a:rPr lang="es-CO" altLang="es-CO" sz="3600" dirty="0"/>
+              <a:rPr lang="es-CO" sz="3600" noProof="0" dirty="0"/>
               <a:t>2</a:t>
             </a:r>
           </a:p>
@@ -8207,11 +8356,11 @@
               <a:buNone/>
             </a:pPr>
             <a:r>
-              <a:rPr lang="es-CO" altLang="es-CO" sz="1200" dirty="0"/>
+              <a:rPr lang="es-CO" sz="1200" noProof="0" dirty="0"/>
               <a:t> </a:t>
             </a:r>
             <a:r>
-              <a:rPr lang="es-CO" altLang="es-CO" sz="1400" dirty="0"/>
+              <a:rPr lang="es-CO" sz="1400" noProof="0" dirty="0"/>
               <a:t>Jueves:     18:00 - 20:00</a:t>
             </a:r>
           </a:p>
@@ -8224,7 +8373,7 @@
               <a:buNone/>
             </a:pPr>
             <a:r>
-              <a:rPr lang="es-CO" altLang="es-CO" sz="1400" dirty="0"/>
+              <a:rPr lang="es-CO" sz="1400" noProof="0" dirty="0"/>
               <a:t>  Jueves:      20:15 – 21:15</a:t>
             </a:r>
           </a:p>
@@ -8444,7 +8593,7 @@
               <a:defRPr/>
             </a:pPr>
             <a:r>
-              <a:rPr lang="es-CO" sz="2000" b="1" dirty="0">
+              <a:rPr lang="es-CO" sz="2000" b="1" noProof="0" dirty="0">
                 <a:solidFill>
                   <a:schemeClr val="tx1">
                     <a:lumMod val="75000"/>
@@ -8469,7 +8618,13 @@
           <p:cNvGraphicFramePr>
             <a:graphicFrameLocks noGrp="1"/>
           </p:cNvGraphicFramePr>
-          <p:nvPr/>
+          <p:nvPr>
+            <p:extLst>
+              <p:ext uri="{D42A27DB-BD31-4B8C-83A1-F6EECF244321}">
+                <p14:modId xmlns:p14="http://schemas.microsoft.com/office/powerpoint/2010/main" val="1515091491"/>
+              </p:ext>
+            </p:extLst>
+          </p:nvPr>
         </p:nvGraphicFramePr>
         <p:xfrm>
           <a:off x="863588" y="620688"/>
@@ -8512,7 +8667,7 @@
                     <a:p>
                       <a:pPr algn="ctr"/>
                       <a:r>
-                        <a:rPr lang="es-CO" sz="1000" dirty="0"/>
+                        <a:rPr lang="es-CO" sz="1000" noProof="0" dirty="0"/>
                         <a:t>Semana</a:t>
                       </a:r>
                     </a:p>
@@ -8536,7 +8691,7 @@
                     <a:p>
                       <a:pPr algn="ctr"/>
                       <a:r>
-                        <a:rPr lang="es-CO" sz="1000" dirty="0"/>
+                        <a:rPr lang="es-CO" sz="1000" noProof="0" dirty="0"/>
                         <a:t>Fechas</a:t>
                       </a:r>
                     </a:p>
@@ -8560,7 +8715,7 @@
                     <a:p>
                       <a:pPr algn="ctr"/>
                       <a:r>
-                        <a:rPr lang="es-CO" sz="1000" dirty="0"/>
+                        <a:rPr lang="es-CO" sz="1000" noProof="0" dirty="0"/>
                         <a:t>Nombre</a:t>
                       </a:r>
                     </a:p>
@@ -8591,7 +8746,7 @@
                     <a:p>
                       <a:pPr algn="ctr"/>
                       <a:r>
-                        <a:rPr lang="es-CO" sz="1000" dirty="0"/>
+                        <a:rPr lang="es-CO" sz="1000" noProof="0" dirty="0"/>
                         <a:t>1</a:t>
                       </a:r>
                     </a:p>
@@ -8642,7 +8797,7 @@
                     <a:p>
                       <a:pPr algn="ctr"/>
                       <a:r>
-                        <a:rPr lang="es-CO" sz="1000" dirty="0"/>
+                        <a:rPr lang="es-CO" sz="1000" noProof="0" dirty="0"/>
                         <a:t>3 febrero – 7 febrero</a:t>
                       </a:r>
                     </a:p>
@@ -8709,7 +8864,7 @@
                         <a:defRPr/>
                       </a:pPr>
                       <a:r>
-                        <a:rPr lang="es-CO" sz="1000" dirty="0"/>
+                        <a:rPr lang="es-CO" sz="1000" noProof="0" dirty="0"/>
                         <a:t>Introducción</a:t>
                       </a:r>
                     </a:p>
@@ -8732,7 +8887,7 @@
                         <a:defRPr/>
                       </a:pPr>
                       <a:r>
-                        <a:rPr lang="es-CO" sz="1000" dirty="0"/>
+                        <a:rPr lang="es-CO" sz="1000" noProof="0" dirty="0"/>
                         <a:t>Introducción a C (Tipos de Datos, Operadores, Variables y Arreglos)</a:t>
                       </a:r>
                     </a:p>
@@ -8790,7 +8945,7 @@
                     <a:p>
                       <a:pPr algn="ctr"/>
                       <a:r>
-                        <a:rPr lang="es-CO" sz="1000" dirty="0"/>
+                        <a:rPr lang="es-CO" sz="1000" noProof="0" dirty="0"/>
                         <a:t>2</a:t>
                       </a:r>
                     </a:p>
@@ -8841,7 +8996,7 @@
                     <a:p>
                       <a:pPr algn="ctr"/>
                       <a:r>
-                        <a:rPr lang="es-CO" sz="1000" dirty="0">
+                        <a:rPr lang="es-CO" sz="1000" noProof="0" dirty="0">
                           <a:solidFill>
                             <a:schemeClr val="tx1"/>
                           </a:solidFill>
@@ -8912,15 +9067,15 @@
                         <a:defRPr/>
                       </a:pPr>
                       <a:r>
-                        <a:rPr lang="es-CO" sz="1000" dirty="0"/>
+                        <a:rPr lang="es-CO" sz="1000" noProof="0" dirty="0"/>
                         <a:t>Introducción a C (Sentencias, Ciclos, Funciones, </a:t>
                       </a:r>
                       <a:r>
-                        <a:rPr lang="es-CO" sz="1000" dirty="0" err="1"/>
+                        <a:rPr lang="es-CO" sz="1000" noProof="0" dirty="0" err="1"/>
                         <a:t>Libreria</a:t>
                       </a:r>
                       <a:r>
-                        <a:rPr lang="es-CO" sz="1000" dirty="0"/>
+                        <a:rPr lang="es-CO" sz="1000" noProof="0" dirty="0"/>
                         <a:t>)</a:t>
                       </a:r>
                     </a:p>
@@ -8978,7 +9133,7 @@
                     <a:p>
                       <a:pPr algn="ctr"/>
                       <a:r>
-                        <a:rPr lang="es-CO" sz="1000" dirty="0"/>
+                        <a:rPr lang="es-CO" sz="1000" noProof="0" dirty="0"/>
                         <a:t>3</a:t>
                       </a:r>
                     </a:p>
@@ -9029,7 +9184,7 @@
                     <a:p>
                       <a:pPr algn="ctr"/>
                       <a:r>
-                        <a:rPr lang="es-CO" sz="1000" dirty="0">
+                        <a:rPr lang="es-CO" sz="1000" noProof="0" dirty="0">
                           <a:solidFill>
                             <a:schemeClr val="tx1"/>
                           </a:solidFill>
@@ -9100,7 +9255,7 @@
                         <a:defRPr/>
                       </a:pPr>
                       <a:r>
-                        <a:rPr lang="es-CO" sz="1000" dirty="0"/>
+                        <a:rPr lang="es-CO" sz="1000" noProof="0" dirty="0"/>
                         <a:t>Laboratorio</a:t>
                       </a:r>
                     </a:p>
@@ -9158,7 +9313,7 @@
                     <a:p>
                       <a:pPr algn="ctr"/>
                       <a:r>
-                        <a:rPr lang="es-CO" sz="1000" dirty="0"/>
+                        <a:rPr lang="es-CO" sz="1000" noProof="0" dirty="0"/>
                         <a:t>4</a:t>
                       </a:r>
                     </a:p>
@@ -9209,7 +9364,7 @@
                     <a:p>
                       <a:pPr algn="ctr"/>
                       <a:r>
-                        <a:rPr lang="es-CO" sz="1000" dirty="0">
+                        <a:rPr lang="es-CO" sz="1000" noProof="0" dirty="0">
                           <a:solidFill>
                             <a:schemeClr val="tx1"/>
                           </a:solidFill>
@@ -9283,7 +9438,7 @@
                         <a:defRPr/>
                       </a:pPr>
                       <a:r>
-                        <a:rPr lang="es-CO" sz="1000" dirty="0" err="1">
+                        <a:rPr lang="es-CO" sz="1000" noProof="0" dirty="0" err="1">
                           <a:highlight>
                             <a:srgbClr val="00FFFF"/>
                           </a:highlight>
@@ -9291,7 +9446,7 @@
                         <a:t>PSoC</a:t>
                       </a:r>
                       <a:r>
-                        <a:rPr lang="es-CO" sz="1000" dirty="0">
+                        <a:rPr lang="es-CO" sz="1000" noProof="0" dirty="0">
                           <a:highlight>
                             <a:srgbClr val="00FFFF"/>
                           </a:highlight>
@@ -9299,14 +9454,14 @@
                         <a:t> </a:t>
                       </a:r>
                       <a:r>
-                        <a:rPr lang="es-CO" sz="1000" dirty="0" err="1">
+                        <a:rPr lang="es-CO" sz="1000" noProof="0" dirty="0" err="1">
                           <a:highlight>
                             <a:srgbClr val="00FFFF"/>
                           </a:highlight>
                         </a:rPr>
                         <a:t>Creator</a:t>
                       </a:r>
-                      <a:endParaRPr lang="es-CO" sz="1000" dirty="0">
+                      <a:endParaRPr lang="es-CO" sz="1000" noProof="0" dirty="0">
                         <a:highlight>
                           <a:srgbClr val="00FFFF"/>
                         </a:highlight>
@@ -9315,7 +9470,7 @@
                     <a:p>
                       <a:pPr algn="ctr"/>
                       <a:r>
-                        <a:rPr lang="es-CO" sz="1000" dirty="0">
+                        <a:rPr lang="es-CO" sz="1000" noProof="0" dirty="0">
                           <a:highlight>
                             <a:srgbClr val="00FFFF"/>
                           </a:highlight>
@@ -9342,7 +9497,7 @@
                         <a:defRPr/>
                       </a:pPr>
                       <a:r>
-                        <a:rPr lang="es-CO" sz="1000" dirty="0" err="1">
+                        <a:rPr lang="es-CO" sz="1000" noProof="0" dirty="0" err="1">
                           <a:highlight>
                             <a:srgbClr val="00FFFF"/>
                           </a:highlight>
@@ -9350,7 +9505,7 @@
                         <a:t>Debouncer</a:t>
                       </a:r>
                       <a:r>
-                        <a:rPr lang="es-CO" sz="1000" dirty="0">
+                        <a:rPr lang="es-CO" sz="1000" noProof="0" dirty="0">
                           <a:highlight>
                             <a:srgbClr val="00FFFF"/>
                           </a:highlight>
@@ -9358,14 +9513,14 @@
                         <a:t> y </a:t>
                       </a:r>
                       <a:r>
-                        <a:rPr lang="es-CO" sz="1000" dirty="0" err="1">
+                        <a:rPr lang="es-CO" sz="1000" noProof="0" dirty="0" err="1">
                           <a:highlight>
                             <a:srgbClr val="00FFFF"/>
                           </a:highlight>
                         </a:rPr>
                         <a:t>Debugging</a:t>
                       </a:r>
-                      <a:endParaRPr lang="es-CO" sz="1000" dirty="0">
+                      <a:endParaRPr lang="es-CO" sz="1000" noProof="0" dirty="0">
                         <a:highlight>
                           <a:srgbClr val="00FFFF"/>
                         </a:highlight>
@@ -9425,7 +9580,7 @@
                     <a:p>
                       <a:pPr algn="ctr"/>
                       <a:r>
-                        <a:rPr lang="es-CO" sz="1000" dirty="0"/>
+                        <a:rPr lang="es-CO" sz="1000" noProof="0" dirty="0"/>
                         <a:t>5</a:t>
                       </a:r>
                     </a:p>
@@ -9476,7 +9631,7 @@
                     <a:p>
                       <a:pPr algn="ctr"/>
                       <a:r>
-                        <a:rPr lang="es-CO" sz="1000" dirty="0"/>
+                        <a:rPr lang="es-CO" sz="1000" noProof="0" dirty="0"/>
                         <a:t>3 marzo – 7 marzo</a:t>
                       </a:r>
                     </a:p>
@@ -9527,7 +9682,7 @@
                     <a:p>
                       <a:pPr algn="ctr"/>
                       <a:r>
-                        <a:rPr lang="es-CO" sz="1000" dirty="0"/>
+                        <a:rPr lang="es-CO" sz="1000" noProof="0" dirty="0"/>
                         <a:t>Laboratorio</a:t>
                       </a:r>
                     </a:p>
@@ -9585,7 +9740,7 @@
                     <a:p>
                       <a:pPr algn="ctr"/>
                       <a:r>
-                        <a:rPr lang="es-CO" sz="1000" dirty="0"/>
+                        <a:rPr lang="es-CO" sz="1000" noProof="0" dirty="0"/>
                         <a:t>6</a:t>
                       </a:r>
                     </a:p>
@@ -9636,7 +9791,7 @@
                     <a:p>
                       <a:pPr algn="ctr"/>
                       <a:r>
-                        <a:rPr lang="es-CO" sz="1000" dirty="0">
+                        <a:rPr lang="es-CO" sz="1000" noProof="0" dirty="0">
                           <a:solidFill>
                             <a:schemeClr val="tx1"/>
                           </a:solidFill>
@@ -9691,7 +9846,7 @@
                     <a:p>
                       <a:pPr algn="ctr"/>
                       <a:r>
-                        <a:rPr lang="es-CO" sz="1000" b="1" u="sng" dirty="0">
+                        <a:rPr lang="es-CO" sz="1000" b="1" u="sng" noProof="0" dirty="0">
                           <a:solidFill>
                             <a:srgbClr val="C00000"/>
                           </a:solidFill>
@@ -9753,7 +9908,7 @@
                     <a:p>
                       <a:pPr algn="ctr"/>
                       <a:r>
-                        <a:rPr lang="es-CO" sz="1000" dirty="0"/>
+                        <a:rPr lang="es-CO" sz="1000" noProof="0" dirty="0"/>
                         <a:t>7</a:t>
                       </a:r>
                     </a:p>
@@ -9804,7 +9959,7 @@
                     <a:p>
                       <a:pPr algn="ctr"/>
                       <a:r>
-                        <a:rPr lang="es-CO" sz="1000" dirty="0"/>
+                        <a:rPr lang="es-CO" sz="1000" noProof="0" dirty="0"/>
                         <a:t> 17 marzo – 21 marzo</a:t>
                       </a:r>
                     </a:p>
@@ -9855,7 +10010,7 @@
                     <a:p>
                       <a:pPr algn="ctr"/>
                       <a:r>
-                        <a:rPr lang="es-ES" sz="1000" dirty="0"/>
+                        <a:rPr lang="es-CO" sz="1000" noProof="0" dirty="0"/>
                         <a:t>Interrupciones Internas y EEPROM</a:t>
                       </a:r>
                     </a:p>
@@ -9913,7 +10068,7 @@
                     <a:p>
                       <a:pPr algn="ctr"/>
                       <a:r>
-                        <a:rPr lang="es-CO" sz="1000" dirty="0"/>
+                        <a:rPr lang="es-CO" sz="1000" noProof="0" dirty="0"/>
                         <a:t>8</a:t>
                       </a:r>
                     </a:p>
@@ -9964,7 +10119,7 @@
                     <a:p>
                       <a:pPr algn="ctr"/>
                       <a:r>
-                        <a:rPr lang="es-CO" sz="1000" dirty="0">
+                        <a:rPr lang="es-CO" sz="1000" noProof="0" dirty="0">
                           <a:solidFill>
                             <a:srgbClr val="FF0000"/>
                           </a:solidFill>
@@ -10038,7 +10193,7 @@
                         <a:defRPr/>
                       </a:pPr>
                       <a:r>
-                        <a:rPr lang="es-CO" sz="1000" dirty="0"/>
+                        <a:rPr lang="es-CO" sz="1000" noProof="0" dirty="0"/>
                         <a:t>Temporizadores y Contadores</a:t>
                       </a:r>
                     </a:p>
@@ -10096,7 +10251,7 @@
                     <a:p>
                       <a:pPr algn="ctr"/>
                       <a:r>
-                        <a:rPr lang="es-CO" sz="1000" dirty="0"/>
+                        <a:rPr lang="es-CO" sz="1000" noProof="0" dirty="0"/>
                         <a:t>9</a:t>
                       </a:r>
                     </a:p>
@@ -10147,7 +10302,7 @@
                     <a:p>
                       <a:pPr algn="ctr"/>
                       <a:r>
-                        <a:rPr lang="es-CO" sz="1000" dirty="0">
+                        <a:rPr lang="es-CO" sz="1000" noProof="0" dirty="0">
                           <a:solidFill>
                             <a:schemeClr val="tx1"/>
                           </a:solidFill>
@@ -10202,7 +10357,7 @@
                     <a:p>
                       <a:pPr algn="ctr"/>
                       <a:r>
-                        <a:rPr lang="es-ES" sz="1000" dirty="0"/>
+                        <a:rPr lang="es-CO" sz="1000" noProof="0" dirty="0"/>
                         <a:t>PWM</a:t>
                       </a:r>
                     </a:p>
@@ -10260,10 +10415,9 @@
                     <a:p>
                       <a:pPr algn="ctr"/>
                       <a:r>
-                        <a:rPr lang="es-ES" sz="1000" dirty="0"/>
+                        <a:rPr lang="es-CO" sz="1000" noProof="0" dirty="0"/>
                         <a:t>10</a:t>
                       </a:r>
-                      <a:endParaRPr lang="es-CO" sz="1000" dirty="0"/>
                     </a:p>
                   </a:txBody>
                   <a:tcPr>
@@ -10312,7 +10466,7 @@
                     <a:p>
                       <a:pPr algn="ctr"/>
                       <a:r>
-                        <a:rPr lang="es-CO" sz="1000" dirty="0"/>
+                        <a:rPr lang="es-CO" sz="1000" noProof="0" dirty="0"/>
                         <a:t>7 abril – 11 abril</a:t>
                       </a:r>
                     </a:p>
@@ -10379,7 +10533,7 @@
                         <a:defRPr/>
                       </a:pPr>
                       <a:r>
-                        <a:rPr lang="es-ES" sz="1000" dirty="0"/>
+                        <a:rPr lang="es-CO" sz="1000" noProof="0" dirty="0"/>
                         <a:t>Conversores ADC y DAC</a:t>
                       </a:r>
                     </a:p>
@@ -10437,7 +10591,7 @@
                     <a:p>
                       <a:pPr algn="ctr"/>
                       <a:r>
-                        <a:rPr lang="es-CO" sz="1000" dirty="0"/>
+                        <a:rPr lang="es-CO" sz="1000" noProof="0" dirty="0"/>
                         <a:t>11</a:t>
                       </a:r>
                     </a:p>
@@ -10488,7 +10642,7 @@
                     <a:p>
                       <a:pPr algn="ctr"/>
                       <a:r>
-                        <a:rPr lang="es-CO" sz="1000" dirty="0">
+                        <a:rPr lang="es-CO" sz="1000" noProof="0" dirty="0">
                           <a:solidFill>
                             <a:srgbClr val="FF0000"/>
                           </a:solidFill>
@@ -10562,7 +10716,7 @@
                         <a:defRPr/>
                       </a:pPr>
                       <a:r>
-                        <a:rPr lang="es-CO" sz="1000" dirty="0"/>
+                        <a:rPr lang="es-CO" sz="1000" noProof="0" dirty="0"/>
                         <a:t>Laboratorio</a:t>
                       </a:r>
                     </a:p>
@@ -10620,7 +10774,7 @@
                     <a:p>
                       <a:pPr algn="ctr"/>
                       <a:r>
-                        <a:rPr lang="es-CO" sz="1000" dirty="0"/>
+                        <a:rPr lang="es-CO" sz="1000" noProof="0" dirty="0"/>
                         <a:t>12</a:t>
                       </a:r>
                     </a:p>
@@ -10671,7 +10825,7 @@
                     <a:p>
                       <a:pPr algn="ctr"/>
                       <a:r>
-                        <a:rPr lang="es-CO" sz="1000" dirty="0">
+                        <a:rPr lang="es-CO" sz="1000" noProof="0" dirty="0">
                           <a:solidFill>
                             <a:schemeClr val="tx1"/>
                           </a:solidFill>
@@ -10742,7 +10896,7 @@
                         <a:defRPr/>
                       </a:pPr>
                       <a:r>
-                        <a:rPr lang="es-CO" sz="1000" b="1" u="sng" dirty="0">
+                        <a:rPr lang="es-CO" sz="1000" b="1" u="sng" noProof="0" dirty="0">
                           <a:solidFill>
                             <a:srgbClr val="C00000"/>
                           </a:solidFill>
@@ -10804,7 +10958,7 @@
                     <a:p>
                       <a:pPr algn="ctr"/>
                       <a:r>
-                        <a:rPr lang="es-CO" sz="1000" dirty="0"/>
+                        <a:rPr lang="es-CO" sz="1000" noProof="0" dirty="0"/>
                         <a:t>13</a:t>
                       </a:r>
                     </a:p>
@@ -10871,7 +11025,7 @@
                         <a:defRPr/>
                       </a:pPr>
                       <a:r>
-                        <a:rPr lang="es-CO" sz="1000" dirty="0"/>
+                        <a:rPr lang="es-CO" sz="1000" noProof="0" dirty="0"/>
                         <a:t>28 abril – 2 mayo</a:t>
                       </a:r>
                     </a:p>
@@ -10938,7 +11092,7 @@
                         <a:defRPr/>
                       </a:pPr>
                       <a:r>
-                        <a:rPr lang="es-CO" sz="1000" dirty="0"/>
+                        <a:rPr lang="es-CO" sz="1000" noProof="0" dirty="0"/>
                         <a:t>Comunicaciones RS232</a:t>
                       </a:r>
                     </a:p>
@@ -10996,7 +11150,7 @@
                     <a:p>
                       <a:pPr algn="ctr"/>
                       <a:r>
-                        <a:rPr lang="es-ES" sz="1000" dirty="0"/>
+                        <a:rPr lang="es-CO" sz="1000" noProof="0" dirty="0"/>
                         <a:t>14</a:t>
                       </a:r>
                     </a:p>
@@ -11063,7 +11217,7 @@
                         <a:defRPr/>
                       </a:pPr>
                       <a:r>
-                        <a:rPr lang="es-CO" sz="1000" dirty="0">
+                        <a:rPr lang="es-CO" sz="1000" noProof="0" dirty="0">
                           <a:solidFill>
                             <a:schemeClr val="tx1"/>
                           </a:solidFill>
@@ -11134,7 +11288,7 @@
                         <a:defRPr/>
                       </a:pPr>
                       <a:r>
-                        <a:rPr lang="es-CO" sz="1000" dirty="0"/>
+                        <a:rPr lang="es-CO" sz="1000" noProof="0" dirty="0"/>
                         <a:t>Comunicaciones I2C </a:t>
                       </a:r>
                     </a:p>
@@ -11192,10 +11346,9 @@
                     <a:p>
                       <a:pPr algn="ctr"/>
                       <a:r>
-                        <a:rPr lang="es-ES" sz="1000" dirty="0"/>
+                        <a:rPr lang="es-CO" sz="1000" noProof="0" dirty="0"/>
                         <a:t>15</a:t>
                       </a:r>
-                      <a:endParaRPr lang="es-CO" sz="1000" dirty="0"/>
                     </a:p>
                   </a:txBody>
                   <a:tcPr>
@@ -11260,7 +11413,7 @@
                         <a:defRPr/>
                       </a:pPr>
                       <a:r>
-                        <a:rPr lang="es-CO" sz="1000" dirty="0">
+                        <a:rPr lang="es-CO" sz="1000" noProof="0" dirty="0">
                           <a:solidFill>
                             <a:schemeClr val="tx1"/>
                           </a:solidFill>
@@ -11331,7 +11484,7 @@
                         <a:defRPr/>
                       </a:pPr>
                       <a:r>
-                        <a:rPr lang="es-CO" sz="1000" dirty="0"/>
+                        <a:rPr lang="es-CO" sz="1000" noProof="0" dirty="0"/>
                         <a:t>Comunicaciones I2S</a:t>
                       </a:r>
                     </a:p>
@@ -11389,10 +11542,9 @@
                     <a:p>
                       <a:pPr algn="ctr"/>
                       <a:r>
-                        <a:rPr lang="es-ES" sz="1000" dirty="0"/>
+                        <a:rPr lang="es-CO" sz="1000" noProof="0" dirty="0"/>
                         <a:t>16</a:t>
                       </a:r>
-                      <a:endParaRPr lang="es-CO" sz="1000" dirty="0"/>
                     </a:p>
                   </a:txBody>
                   <a:tcPr>
@@ -11441,7 +11593,7 @@
                     <a:p>
                       <a:pPr algn="ctr"/>
                       <a:r>
-                        <a:rPr lang="es-CO" sz="1000" dirty="0">
+                        <a:rPr lang="es-CO" sz="1000" noProof="0" dirty="0">
                           <a:solidFill>
                             <a:schemeClr val="tx1"/>
                           </a:solidFill>
@@ -11515,7 +11667,7 @@
                         <a:defRPr/>
                       </a:pPr>
                       <a:r>
-                        <a:rPr lang="es-CO" sz="1000" b="0" i="0" u="none" dirty="0">
+                        <a:rPr lang="es-CO" sz="1000" b="0" i="0" u="none" noProof="0" dirty="0">
                           <a:solidFill>
                             <a:schemeClr val="tx1"/>
                           </a:solidFill>
@@ -11580,10 +11732,9 @@
                     <a:p>
                       <a:pPr algn="ctr"/>
                       <a:r>
-                        <a:rPr lang="es-ES" sz="1000" dirty="0"/>
+                        <a:rPr lang="es-CO" sz="1000" noProof="0" dirty="0"/>
                         <a:t>17</a:t>
                       </a:r>
-                      <a:endParaRPr lang="es-CO" sz="1000" dirty="0"/>
                     </a:p>
                   </a:txBody>
                   <a:tcPr>
@@ -11632,7 +11783,7 @@
                     <a:p>
                       <a:pPr algn="ctr"/>
                       <a:r>
-                        <a:rPr lang="es-CO" sz="1000" dirty="0">
+                        <a:rPr lang="es-CO" sz="1000" noProof="0" dirty="0">
                           <a:solidFill>
                             <a:schemeClr val="tx1"/>
                           </a:solidFill>
@@ -11687,7 +11838,7 @@
                     <a:p>
                       <a:pPr algn="ctr"/>
                       <a:r>
-                        <a:rPr lang="es-CO" sz="1000" b="0" i="0" u="none" dirty="0">
+                        <a:rPr lang="es-CO" sz="1000" b="0" i="0" u="none" noProof="0" dirty="0">
                           <a:solidFill>
                             <a:schemeClr val="tx1"/>
                           </a:solidFill>
@@ -11749,7 +11900,7 @@
                     <a:p>
                       <a:pPr algn="ctr"/>
                       <a:r>
-                        <a:rPr lang="es-CO" sz="1000" dirty="0"/>
+                        <a:rPr lang="es-CO" sz="1000" noProof="0" dirty="0"/>
                         <a:t>18</a:t>
                       </a:r>
                     </a:p>
@@ -11800,7 +11951,7 @@
                     <a:p>
                       <a:pPr algn="ctr"/>
                       <a:r>
-                        <a:rPr lang="es-CO" sz="1000" dirty="0">
+                        <a:rPr lang="es-CO" sz="1000" noProof="0" dirty="0">
                           <a:solidFill>
                             <a:srgbClr val="FF0000"/>
                           </a:solidFill>
@@ -11874,7 +12025,7 @@
                         <a:defRPr/>
                       </a:pPr>
                       <a:r>
-                        <a:rPr lang="es-CO" sz="1000" b="1" u="sng" dirty="0">
+                        <a:rPr lang="es-CO" sz="1000" b="1" u="sng" noProof="0" dirty="0">
                           <a:solidFill>
                             <a:srgbClr val="C00000"/>
                           </a:solidFill>
@@ -12055,7 +12206,7 @@
           </a:lstStyle>
           <a:p>
             <a:r>
-              <a:rPr lang="es-CO" sz="1400" dirty="0">
+              <a:rPr lang="es-CO" sz="1400" noProof="0" dirty="0">
                 <a:highlight>
                   <a:srgbClr val="00FFFF"/>
                 </a:highlight>
@@ -12063,7 +12214,7 @@
               <a:t>Tarjeta de Desarrollo </a:t>
             </a:r>
             <a:r>
-              <a:rPr lang="es-CO" sz="1400" dirty="0" err="1">
+              <a:rPr lang="es-CO" sz="1400" noProof="0" dirty="0" err="1">
                 <a:highlight>
                   <a:srgbClr val="00FFFF"/>
                 </a:highlight>
@@ -12071,7 +12222,7 @@
               <a:t>PSoc</a:t>
             </a:r>
             <a:r>
-              <a:rPr lang="es-CO" sz="1400" dirty="0">
+              <a:rPr lang="es-CO" sz="1400" noProof="0" dirty="0">
                 <a:highlight>
                   <a:srgbClr val="00FFFF"/>
                 </a:highlight>
@@ -12079,7 +12230,7 @@
               <a:t> 5LP (Se requieren materiales como leds </a:t>
             </a:r>
             <a:r>
-              <a:rPr lang="es-CO" sz="1400" dirty="0" err="1">
+              <a:rPr lang="es-CO" sz="1400" noProof="0" dirty="0" err="1">
                 <a:highlight>
                   <a:srgbClr val="00FFFF"/>
                 </a:highlight>
@@ -12087,7 +12238,7 @@
               <a:t>etc</a:t>
             </a:r>
             <a:r>
-              <a:rPr lang="es-CO" sz="1400" dirty="0">
+              <a:rPr lang="es-CO" sz="1400" noProof="0" dirty="0">
                 <a:highlight>
                   <a:srgbClr val="00FFFF"/>
                 </a:highlight>
@@ -12097,7 +12248,7 @@
           </a:p>
           <a:p>
             <a:r>
-              <a:rPr lang="es-CO" sz="1400" dirty="0">
+              <a:rPr lang="es-CO" sz="1400" noProof="0" dirty="0">
                 <a:highlight>
                   <a:srgbClr val="FF00FF"/>
                 </a:highlight>
@@ -12105,7 +12256,7 @@
               <a:t>Tarjeta de Desarrollo Arduino Nano BLE </a:t>
             </a:r>
             <a:r>
-              <a:rPr lang="es-CO" sz="1400" dirty="0" err="1">
+              <a:rPr lang="es-CO" sz="1400" noProof="0" dirty="0" err="1">
                 <a:highlight>
                   <a:srgbClr val="FF00FF"/>
                 </a:highlight>
@@ -12113,7 +12264,7 @@
               <a:t>sense</a:t>
             </a:r>
             <a:r>
-              <a:rPr lang="es-CO" sz="1400" dirty="0">
+              <a:rPr lang="es-CO" sz="1400" noProof="0" dirty="0">
                 <a:highlight>
                   <a:srgbClr val="FF00FF"/>
                 </a:highlight>
@@ -12121,7 +12272,7 @@
               <a:t> </a:t>
             </a:r>
             <a:r>
-              <a:rPr lang="es-CO" sz="1400" dirty="0" err="1">
+              <a:rPr lang="es-CO" sz="1400" noProof="0" dirty="0" err="1">
                 <a:highlight>
                   <a:srgbClr val="FF00FF"/>
                 </a:highlight>
@@ -12129,7 +12280,7 @@
               <a:t>Rev</a:t>
             </a:r>
             <a:r>
-              <a:rPr lang="es-CO" sz="1400" dirty="0">
+              <a:rPr lang="es-CO" sz="1400" noProof="0" dirty="0">
                 <a:highlight>
                   <a:srgbClr val="FF00FF"/>
                 </a:highlight>
@@ -12138,7 +12289,7 @@
             </a:r>
           </a:p>
           <a:p>
-            <a:endParaRPr lang="es-CO" sz="1400" dirty="0">
+            <a:endParaRPr lang="es-CO" sz="1400" noProof="0" dirty="0">
               <a:highlight>
                 <a:srgbClr val="FF00FF"/>
               </a:highlight>
@@ -12203,7 +12354,7 @@
           <a:lstStyle/>
           <a:p>
             <a:r>
-              <a:rPr lang="es-CO" dirty="0"/>
+              <a:rPr lang="es-CO" noProof="0" dirty="0"/>
               <a:t>OBJETIVO</a:t>
             </a:r>
           </a:p>
@@ -12239,15 +12390,15 @@
           <a:p>
             <a:pPr algn="just"/>
             <a:r>
-              <a:rPr lang="es-CO" sz="2400" dirty="0"/>
+              <a:rPr lang="es-CO" sz="2400" noProof="0" dirty="0"/>
               <a:t>Familiarizar a los estudiantes con el concepto de contadores, temporizadores, real time </a:t>
             </a:r>
             <a:r>
-              <a:rPr lang="es-CO" sz="2400" dirty="0" err="1"/>
+              <a:rPr lang="es-CO" sz="2400" noProof="0" dirty="0" err="1"/>
               <a:t>clocks</a:t>
             </a:r>
             <a:r>
-              <a:rPr lang="es-CO" sz="2400" dirty="0"/>
+              <a:rPr lang="es-CO" sz="2400" noProof="0" dirty="0"/>
               <a:t> y modulación por ancho de pulso en los microcontroladores.</a:t>
             </a:r>
           </a:p>
@@ -12485,10 +12636,10 @@
           <a:p>
             <a:pPr algn="ctr" eaLnBrk="1" hangingPunct="1"/>
             <a:r>
-              <a:rPr lang="es-CO" altLang="es-CO" sz="3200" b="0" dirty="0"/>
+              <a:rPr lang="es-CO" sz="3200" b="0" noProof="0" dirty="0"/>
               <a:t>3</a:t>
             </a:r>
-            <a:endParaRPr lang="es-CO" altLang="es-CO" sz="3600" b="0" dirty="0"/>
+            <a:endParaRPr lang="es-CO" sz="3600" b="0" noProof="0" dirty="0"/>
           </a:p>
         </p:txBody>
       </p:sp>
@@ -12753,7 +12904,7 @@
               <a:defRPr/>
             </a:pPr>
             <a:r>
-              <a:rPr lang="es-CO" sz="2000" b="1" dirty="0">
+              <a:rPr lang="es-CO" sz="2000" b="1" noProof="0" dirty="0">
                 <a:solidFill>
                   <a:schemeClr val="tx1">
                     <a:lumMod val="75000"/>
@@ -12839,14 +12990,11 @@
               </a:spcAft>
             </a:pPr>
             <a:r>
-              <a:rPr lang="en-US" sz="3200" b="1" i="0" dirty="0" err="1">
+              <a:rPr lang="es-CO" sz="3200" b="1" i="0" noProof="0" dirty="0">
                 <a:effectLst/>
               </a:rPr>
               <a:t>Actividad</a:t>
             </a:r>
-            <a:endParaRPr lang="en-US" sz="3200" b="1" i="0" dirty="0">
-              <a:effectLst/>
-            </a:endParaRPr>
           </a:p>
         </p:txBody>
       </p:sp>
@@ -12937,14 +13085,11 @@
           <a:p>
             <a:pPr algn="l"/>
             <a:r>
-              <a:rPr lang="es-CO" sz="1400" b="1" dirty="0">
+              <a:rPr lang="es-CO" sz="1400" b="1" noProof="0" dirty="0">
                 <a:latin typeface="+mj-lt"/>
               </a:rPr>
               <a:t>El registro actual debe ser almacenado en memoria. </a:t>
             </a:r>
-            <a:endParaRPr lang="es-CO" sz="1400" b="1" noProof="0" dirty="0">
-              <a:latin typeface="+mj-lt"/>
-            </a:endParaRPr>
           </a:p>
           <a:p>
             <a:pPr algn="l"/>
@@ -12997,20 +13142,20 @@
           <a:p>
             <a:pPr algn="l"/>
             <a:r>
-              <a:rPr lang="es-CO" sz="1400" b="1" dirty="0">
+              <a:rPr lang="es-CO" sz="1400" b="1" noProof="0" dirty="0">
                 <a:latin typeface="+mj-lt"/>
               </a:rPr>
               <a:t>Al usuario 1000 (Implemente un contador) se le dará un premio (El grupo define el sistema de notificación ej. Sonoro o visual etc.). El sistema debe almacenar en memoria la fecha y hora de este evento (RTC</a:t>
             </a:r>
             <a:r>
-              <a:rPr lang="es-CO" sz="1400" b="1" dirty="0">
+              <a:rPr lang="es-CO" sz="1400" b="1" noProof="0" dirty="0">
                 <a:latin typeface="+mj-lt"/>
                 <a:sym typeface="Wingdings" panose="05000000000000000000" pitchFamily="2" charset="2"/>
               </a:rPr>
               <a:t></a:t>
             </a:r>
             <a:r>
-              <a:rPr lang="es-CO" sz="1400" b="1" dirty="0">
+              <a:rPr lang="es-CO" sz="1400" b="1" noProof="0" dirty="0">
                 <a:latin typeface="+mj-lt"/>
               </a:rPr>
               <a:t> EEPROM).</a:t>
@@ -13025,44 +13170,35 @@
           <a:p>
             <a:pPr algn="l"/>
             <a:r>
-              <a:rPr lang="es-CO" sz="1400" b="1">
+              <a:rPr lang="es-CO" sz="1400" b="1" noProof="0" dirty="0">
                 <a:latin typeface="+mj-lt"/>
               </a:rPr>
-              <a:t>INCLUIR  OP AMP</a:t>
+              <a:t>INCLUIR  OP AMP, </a:t>
             </a:r>
             <a:r>
-              <a:rPr lang="es-CO" sz="1400" b="1" dirty="0">
-                <a:latin typeface="+mj-lt"/>
-              </a:rPr>
-              <a:t>, </a:t>
-            </a:r>
-            <a:r>
-              <a:rPr lang="es-CO" sz="1400" b="1" dirty="0" err="1">
+              <a:rPr lang="es-CO" sz="1400" b="1" noProof="0" dirty="0" err="1">
                 <a:latin typeface="+mj-lt"/>
               </a:rPr>
               <a:t>vDAC</a:t>
             </a:r>
             <a:r>
-              <a:rPr lang="es-CO" sz="1400" b="1" dirty="0">
+              <a:rPr lang="es-CO" sz="1400" b="1" noProof="0" dirty="0">
                 <a:latin typeface="+mj-lt"/>
               </a:rPr>
               <a:t> </a:t>
             </a:r>
             <a:r>
-              <a:rPr lang="es-CO" sz="1400" b="1" dirty="0" err="1">
+              <a:rPr lang="es-CO" sz="1400" b="1" noProof="0" dirty="0" err="1">
                 <a:latin typeface="+mj-lt"/>
               </a:rPr>
               <a:t>iDAC</a:t>
             </a:r>
             <a:r>
-              <a:rPr lang="es-CO" sz="1400" b="1" dirty="0">
+              <a:rPr lang="es-CO" sz="1400" b="1" noProof="0" dirty="0">
                 <a:latin typeface="+mj-lt"/>
               </a:rPr>
               <a:t> Y ADC</a:t>
             </a:r>
-            <a:endParaRPr lang="es-CO" sz="1400" b="1" noProof="0" dirty="0">
-              <a:latin typeface="+mj-lt"/>
-            </a:endParaRPr>
           </a:p>
         </p:txBody>
       </p:sp>
@@ -13259,10 +13395,10 @@
           <a:p>
             <a:pPr algn="ctr" eaLnBrk="1" hangingPunct="1"/>
             <a:r>
-              <a:rPr lang="es-CO" altLang="es-CO" sz="3200" b="0" dirty="0"/>
+              <a:rPr lang="es-CO" sz="3200" b="0" noProof="0" dirty="0"/>
               <a:t>4</a:t>
             </a:r>
-            <a:endParaRPr lang="es-CO" altLang="es-CO" sz="3600" b="0" dirty="0"/>
+            <a:endParaRPr lang="es-CO" sz="3600" b="0" noProof="0" dirty="0"/>
           </a:p>
         </p:txBody>
       </p:sp>
@@ -13527,7 +13663,7 @@
               <a:defRPr/>
             </a:pPr>
             <a:r>
-              <a:rPr lang="es-CO" sz="2000" b="1" dirty="0">
+              <a:rPr lang="es-CO" sz="2000" b="1" noProof="0" dirty="0">
                 <a:solidFill>
                   <a:schemeClr val="tx1">
                     <a:lumMod val="75000"/>
@@ -14415,11 +14551,12 @@
 </file>
 
 <file path=customXml/item1.xml><?xml version="1.0" encoding="utf-8"?>
-<p:properties xmlns:p="http://schemas.microsoft.com/office/2006/metadata/properties" xmlns:xsi="http://www.w3.org/2001/XMLSchema-instance" xmlns:pc="http://schemas.microsoft.com/office/infopath/2007/PartnerControls">
-  <documentManagement>
-    <_activity xmlns="bdc56f61-abc0-4f7e-bfec-a93ccd1ae886" xsi:nil="true"/>
-  </documentManagement>
-</p:properties>
+<?mso-contentType ?>
+<FormTemplates xmlns="http://schemas.microsoft.com/sharepoint/v3/contenttype/forms">
+  <Display>DocumentLibraryForm</Display>
+  <Edit>DocumentLibraryForm</Edit>
+  <New>DocumentLibraryForm</New>
+</FormTemplates>
 </file>
 
 <file path=customXml/item2.xml><?xml version="1.0" encoding="utf-8"?>
@@ -14658,27 +14795,17 @@
 </file>
 
 <file path=customXml/item3.xml><?xml version="1.0" encoding="utf-8"?>
-<?mso-contentType ?>
-<FormTemplates xmlns="http://schemas.microsoft.com/sharepoint/v3/contenttype/forms">
-  <Display>DocumentLibraryForm</Display>
-  <Edit>DocumentLibraryForm</Edit>
-  <New>DocumentLibraryForm</New>
-</FormTemplates>
+<p:properties xmlns:p="http://schemas.microsoft.com/office/2006/metadata/properties" xmlns:xsi="http://www.w3.org/2001/XMLSchema-instance" xmlns:pc="http://schemas.microsoft.com/office/infopath/2007/PartnerControls">
+  <documentManagement>
+    <_activity xmlns="bdc56f61-abc0-4f7e-bfec-a93ccd1ae886" xsi:nil="true"/>
+  </documentManagement>
+</p:properties>
 </file>
 
 <file path=customXml/itemProps1.xml><?xml version="1.0" encoding="utf-8"?>
-<ds:datastoreItem xmlns:ds="http://schemas.openxmlformats.org/officeDocument/2006/customXml" ds:itemID="{0825853C-1B27-4995-A583-4D39F900BB7F}">
+<ds:datastoreItem xmlns:ds="http://schemas.openxmlformats.org/officeDocument/2006/customXml" ds:itemID="{4E8623C8-32E1-48B0-9F0A-13F2E9582B7E}">
   <ds:schemaRefs>
-    <ds:schemaRef ds:uri="http://schemas.microsoft.com/office/2006/documentManagement/types"/>
-    <ds:schemaRef ds:uri="http://purl.org/dc/dcmitype/"/>
-    <ds:schemaRef ds:uri="http://schemas.openxmlformats.org/package/2006/metadata/core-properties"/>
-    <ds:schemaRef ds:uri="669280c1-d17e-4d1d-bd7f-b4f14cc6bf1d"/>
-    <ds:schemaRef ds:uri="http://purl.org/dc/elements/1.1/"/>
-    <ds:schemaRef ds:uri="http://purl.org/dc/terms/"/>
-    <ds:schemaRef ds:uri="http://schemas.microsoft.com/office/infopath/2007/PartnerControls"/>
-    <ds:schemaRef ds:uri="bdc56f61-abc0-4f7e-bfec-a93ccd1ae886"/>
-    <ds:schemaRef ds:uri="http://schemas.microsoft.com/office/2006/metadata/properties"/>
-    <ds:schemaRef ds:uri="http://www.w3.org/XML/1998/namespace"/>
+    <ds:schemaRef ds:uri="http://schemas.microsoft.com/sharepoint/v3/contenttype/forms"/>
   </ds:schemaRefs>
 </ds:datastoreItem>
 </file>
@@ -14703,9 +14830,18 @@
 </file>
 
 <file path=customXml/itemProps3.xml><?xml version="1.0" encoding="utf-8"?>
-<ds:datastoreItem xmlns:ds="http://schemas.openxmlformats.org/officeDocument/2006/customXml" ds:itemID="{4E8623C8-32E1-48B0-9F0A-13F2E9582B7E}">
+<ds:datastoreItem xmlns:ds="http://schemas.openxmlformats.org/officeDocument/2006/customXml" ds:itemID="{0825853C-1B27-4995-A583-4D39F900BB7F}">
   <ds:schemaRefs>
-    <ds:schemaRef ds:uri="http://schemas.microsoft.com/sharepoint/v3/contenttype/forms"/>
+    <ds:schemaRef ds:uri="http://schemas.microsoft.com/office/2006/documentManagement/types"/>
+    <ds:schemaRef ds:uri="http://purl.org/dc/dcmitype/"/>
+    <ds:schemaRef ds:uri="http://schemas.openxmlformats.org/package/2006/metadata/core-properties"/>
+    <ds:schemaRef ds:uri="669280c1-d17e-4d1d-bd7f-b4f14cc6bf1d"/>
+    <ds:schemaRef ds:uri="http://purl.org/dc/elements/1.1/"/>
+    <ds:schemaRef ds:uri="http://purl.org/dc/terms/"/>
+    <ds:schemaRef ds:uri="http://schemas.microsoft.com/office/infopath/2007/PartnerControls"/>
+    <ds:schemaRef ds:uri="bdc56f61-abc0-4f7e-bfec-a93ccd1ae886"/>
+    <ds:schemaRef ds:uri="http://schemas.microsoft.com/office/2006/metadata/properties"/>
+    <ds:schemaRef ds:uri="http://www.w3.org/XML/1998/namespace"/>
   </ds:schemaRefs>
 </ds:datastoreItem>
 </file>
</xml_diff>